<commit_message>
Modified for Private Subnet
</commit_message>
<xml_diff>
--- a/aws/bastion-host-ssh/Jumpbox-Architecture.pptx
+++ b/aws/bastion-host-ssh/Jumpbox-Architecture.pptx
@@ -104,6 +104,11 @@
       </a:defRPr>
     </a:lvl9pPr>
   </p:defaultTextStyle>
+  <p:extLst>
+    <p:ext uri="{EFAFB233-063F-42B5-8137-9DF3F51BA10A}">
+      <p15:sldGuideLst xmlns:p15="http://schemas.microsoft.com/office/powerpoint/2012/main"/>
+    </p:ext>
+  </p:extLst>
 </p:presentation>
 </file>
 
@@ -3202,15 +3207,7 @@
                 <a:ea typeface="Verdana" pitchFamily="34" charset="0"/>
                 <a:cs typeface="Helvetica Neue"/>
               </a:rPr>
-              <a:t>Virtual </a:t>
-            </a:r>
-            <a:r>
-              <a:rPr lang="en-US" sz="900" dirty="0" smtClean="0">
-                <a:latin typeface="Helvetica Neue"/>
-                <a:ea typeface="Verdana" pitchFamily="34" charset="0"/>
-                <a:cs typeface="Helvetica Neue"/>
-              </a:rPr>
-              <a:t>private cloud</a:t>
+              <a:t>Virtual private cloud</a:t>
             </a:r>
             <a:endParaRPr lang="en-US" sz="900" dirty="0">
               <a:latin typeface="Helvetica Neue"/>
@@ -3801,7 +3798,7 @@
           <p:spPr bwMode="auto">
             <a:xfrm>
               <a:off x="4423569" y="2801541"/>
-              <a:ext cx="1949808" cy="328879"/>
+              <a:ext cx="1949808" cy="150964"/>
             </a:xfrm>
             <a:prstGeom prst="rect">
               <a:avLst/>
@@ -3822,7 +3819,7 @@
             <a:p>
               <a:pPr algn="ctr"/>
               <a:r>
-                <a:rPr lang="en-US" sz="900" dirty="0">
+                <a:rPr lang="en-US" sz="900">
                   <a:latin typeface="Helvetica Neue"/>
                   <a:ea typeface="Verdana" pitchFamily="34" charset="0"/>
                   <a:cs typeface="Helvetica Neue"/>
@@ -3830,12 +3827,12 @@
                 <a:t>VPC </a:t>
               </a:r>
               <a:r>
-                <a:rPr lang="en-US" sz="900" dirty="0" smtClean="0">
+                <a:rPr lang="en-US" sz="900" smtClean="0">
                   <a:latin typeface="Helvetica Neue"/>
                   <a:ea typeface="Verdana" pitchFamily="34" charset="0"/>
                   <a:cs typeface="Helvetica Neue"/>
                 </a:rPr>
-                <a:t>Public subnet</a:t>
+                <a:t>Private subnet</a:t>
               </a:r>
               <a:endParaRPr lang="en-US" sz="900" dirty="0">
                 <a:latin typeface="Helvetica Neue"/>
@@ -5035,15 +5032,7 @@
               </a:r>
               <a:r>
                 <a:rPr lang="en-US" sz="1000" dirty="0" smtClean="0"/>
-                <a:t> ssh -W %h:%p joe@</a:t>
-              </a:r>
-              <a:r>
-                <a:rPr lang="en-US" sz="1000" dirty="0" smtClean="0"/>
-                <a:t>50.23.28.92</a:t>
-              </a:r>
-              <a:r>
-                <a:rPr lang="en-US" sz="1000" dirty="0" smtClean="0"/>
-                <a:t> -</a:t>
+                <a:t> ssh -W %h:%p joe@50.23.28.92 -</a:t>
               </a:r>
               <a:r>
                 <a:rPr lang="en-US" sz="1000" dirty="0" err="1" smtClean="0"/>

</xml_diff>